<commit_message>
updates late at night
time to go to bed!
</commit_message>
<xml_diff>
--- a/Tutorial/PowerPoint Versions/Setting Up Main Sever.pptx
+++ b/Tutorial/PowerPoint Versions/Setting Up Main Sever.pptx
@@ -9,8 +9,9 @@
     <p:sldId id="257" r:id="rId3"/>
     <p:sldId id="258" r:id="rId4"/>
     <p:sldId id="259" r:id="rId5"/>
-    <p:sldId id="260" r:id="rId6"/>
-    <p:sldId id="261" r:id="rId7"/>
+    <p:sldId id="262" r:id="rId6"/>
+    <p:sldId id="260" r:id="rId7"/>
+    <p:sldId id="261" r:id="rId8"/>
   </p:sldIdLst>
   <p:sldSz cx="9144000" cy="6858000" type="screen4x3"/>
   <p:notesSz cx="6858000" cy="9144000"/>
@@ -3681,6 +3682,125 @@
           <a:p>
             <a:r>
               <a:rPr lang="en-US" dirty="0" smtClean="0"/>
+              <a:t>Installing Package with Node.js</a:t>
+            </a:r>
+            <a:endParaRPr lang="en-US" dirty="0"/>
+          </a:p>
+        </p:txBody>
+      </p:sp>
+      <p:sp>
+        <p:nvSpPr>
+          <p:cNvPr id="3" name="Content Placeholder 2"/>
+          <p:cNvSpPr>
+            <a:spLocks noGrp="1"/>
+          </p:cNvSpPr>
+          <p:nvPr>
+            <p:ph idx="1"/>
+          </p:nvPr>
+        </p:nvSpPr>
+        <p:spPr/>
+        <p:txBody>
+          <a:bodyPr>
+            <a:normAutofit lnSpcReduction="10000"/>
+          </a:bodyPr>
+          <a:lstStyle/>
+          <a:p>
+            <a:r>
+              <a:rPr lang="en-US" dirty="0" smtClean="0"/>
+              <a:t>Node server uses additonal modules to work</a:t>
+            </a:r>
+          </a:p>
+          <a:p>
+            <a:r>
+              <a:rPr lang="en-US" dirty="0" smtClean="0"/>
+              <a:t>Easy installation with Node’s Package Manager</a:t>
+            </a:r>
+          </a:p>
+          <a:p>
+            <a:endParaRPr lang="en-US" dirty="0"/>
+          </a:p>
+          <a:p>
+            <a:r>
+              <a:rPr lang="en-US" dirty="0" smtClean="0"/>
+              <a:t>Move to the “MainServer” folder</a:t>
+            </a:r>
+          </a:p>
+          <a:p>
+            <a:r>
+              <a:rPr lang="en-US" dirty="0" smtClean="0"/>
+              <a:t>Type </a:t>
+            </a:r>
+            <a:r>
+              <a:rPr lang="en-US" dirty="0" smtClean="0">
+                <a:solidFill>
+                  <a:srgbClr val="00B050"/>
+                </a:solidFill>
+              </a:rPr>
+              <a:t>npm install</a:t>
+            </a:r>
+          </a:p>
+          <a:p>
+            <a:r>
+              <a:rPr lang="en-US" dirty="0" smtClean="0"/>
+              <a:t>All the modules are now in a “node_module” folder</a:t>
+            </a:r>
+          </a:p>
+          <a:p>
+            <a:r>
+              <a:rPr lang="en-US" smtClean="0"/>
+              <a:t>Used the “package.json” file to get info</a:t>
+            </a:r>
+            <a:endParaRPr lang="en-US" dirty="0"/>
+          </a:p>
+        </p:txBody>
+      </p:sp>
+    </p:spTree>
+    <p:extLst>
+      <p:ext uri="{BB962C8B-B14F-4D97-AF65-F5344CB8AC3E}">
+        <p14:creationId xmlns:p14="http://schemas.microsoft.com/office/powerpoint/2010/main" val="3578621772"/>
+      </p:ext>
+    </p:extLst>
+  </p:cSld>
+  <p:clrMapOvr>
+    <a:masterClrMapping/>
+  </p:clrMapOvr>
+</p:sld>
+</file>
+
+<file path=ppt/slides/slide6.xml><?xml version="1.0" encoding="utf-8"?>
+<p:sld xmlns:a="http://schemas.openxmlformats.org/drawingml/2006/main" xmlns:r="http://schemas.openxmlformats.org/officeDocument/2006/relationships" xmlns:p="http://schemas.openxmlformats.org/presentationml/2006/main">
+  <p:cSld>
+    <p:spTree>
+      <p:nvGrpSpPr>
+        <p:cNvPr id="1" name=""/>
+        <p:cNvGrpSpPr/>
+        <p:nvPr/>
+      </p:nvGrpSpPr>
+      <p:grpSpPr>
+        <a:xfrm>
+          <a:off x="0" y="0"/>
+          <a:ext cx="0" cy="0"/>
+          <a:chOff x="0" y="0"/>
+          <a:chExt cx="0" cy="0"/>
+        </a:xfrm>
+      </p:grpSpPr>
+      <p:sp>
+        <p:nvSpPr>
+          <p:cNvPr id="2" name="Title 1"/>
+          <p:cNvSpPr>
+            <a:spLocks noGrp="1"/>
+          </p:cNvSpPr>
+          <p:nvPr>
+            <p:ph type="title"/>
+          </p:nvPr>
+        </p:nvSpPr>
+        <p:spPr/>
+        <p:txBody>
+          <a:bodyPr/>
+          <a:lstStyle/>
+          <a:p>
+            <a:r>
+              <a:rPr lang="en-US" dirty="0" smtClean="0"/>
               <a:t>Running MongoDB</a:t>
             </a:r>
             <a:endParaRPr lang="en-US" dirty="0"/>
@@ -3853,7 +3973,7 @@
 </p:sld>
 </file>
 
-<file path=ppt/slides/slide6.xml><?xml version="1.0" encoding="utf-8"?>
+<file path=ppt/slides/slide7.xml><?xml version="1.0" encoding="utf-8"?>
 <p:sld xmlns:a="http://schemas.openxmlformats.org/drawingml/2006/main" xmlns:r="http://schemas.openxmlformats.org/officeDocument/2006/relationships" xmlns:p="http://schemas.openxmlformats.org/presentationml/2006/main">
   <p:cSld>
     <p:spTree>

</xml_diff>